<commit_message>
update uOS collection image margins
</commit_message>
<xml_diff>
--- a/assets/images/2016/micro-os-plus-collection.pptx
+++ b/assets/images/2016/micro-os-plus-collection.pptx
@@ -2884,8 +2884,8 @@
         </p:nvSpPr>
         <p:spPr>
           <a:xfrm>
-            <a:off x="386252" y="1137274"/>
-            <a:ext cx="8482662" cy="5222465"/>
+            <a:off x="203200" y="1137274"/>
+            <a:ext cx="8788400" cy="5222465"/>
           </a:xfrm>
           <a:prstGeom prst="roundRect">
             <a:avLst>

</xml_diff>